<commit_message>
delete files from runs
</commit_message>
<xml_diff>
--- a/Day 1/1a Introduction/Introduction.pptx
+++ b/Day 1/1a Introduction/Introduction.pptx
@@ -3851,7 +3851,7 @@
         </p:spPr>
         <p:txBody>
           <a:bodyPr>
-            <a:normAutofit lnSpcReduction="10000"/>
+            <a:normAutofit fontScale="92500" lnSpcReduction="10000"/>
           </a:bodyPr>
           <a:lstStyle/>
           <a:p>
@@ -3889,47 +3889,33 @@
                 </a:solidFill>
                 <a:latin typeface="Helvetica" panose="020B0504020202030204" pitchFamily="34" charset="0"/>
               </a:rPr>
-              <a:t>With special thanks to Rob Ahrens and Andre Punt</a:t>
+              <a:t>With special thanks to </a:t>
+            </a:r>
+            <a:r>
+              <a:rPr lang="en-US" dirty="0" err="1">
+                <a:solidFill>
+                  <a:schemeClr val="bg1">
+                    <a:lumMod val="50000"/>
+                  </a:schemeClr>
+                </a:solidFill>
+                <a:latin typeface="Helvetica" panose="020B0504020202030204" pitchFamily="34" charset="0"/>
+              </a:rPr>
+              <a:t>Arni</a:t>
+            </a:r>
+            <a:r>
+              <a:rPr lang="en-US" dirty="0">
+                <a:solidFill>
+                  <a:schemeClr val="bg1">
+                    <a:lumMod val="50000"/>
+                  </a:schemeClr>
+                </a:solidFill>
+                <a:latin typeface="Helvetica" panose="020B0504020202030204" pitchFamily="34" charset="0"/>
+              </a:rPr>
+              <a:t> Magnusson, Rob Ahrens and Andre Punt</a:t>
             </a:r>
           </a:p>
         </p:txBody>
       </p:sp>
-      <p:pic>
-        <p:nvPicPr>
-          <p:cNvPr id="7" name="Picture 6">
-            <a:extLst>
-              <a:ext uri="{FF2B5EF4-FFF2-40B4-BE49-F238E27FC236}">
-                <a16:creationId xmlns:a16="http://schemas.microsoft.com/office/drawing/2014/main" id="{8394C1F9-61B6-4F18-B6C8-2C2B9ECD2F74}"/>
-              </a:ext>
-            </a:extLst>
-          </p:cNvPr>
-          <p:cNvPicPr>
-            <a:picLocks noChangeAspect="1"/>
-          </p:cNvPicPr>
-          <p:nvPr/>
-        </p:nvPicPr>
-        <p:blipFill>
-          <a:blip r:embed="rId3">
-            <a:extLst>
-              <a:ext uri="{28A0092B-C50C-407E-A947-70E740481C1C}">
-                <a14:useLocalDpi xmlns:a14="http://schemas.microsoft.com/office/drawing/2010/main" val="0"/>
-              </a:ext>
-            </a:extLst>
-          </a:blip>
-          <a:stretch>
-            <a:fillRect/>
-          </a:stretch>
-        </p:blipFill>
-        <p:spPr>
-          <a:xfrm>
-            <a:off x="288345" y="5587583"/>
-            <a:ext cx="1847960" cy="1064043"/>
-          </a:xfrm>
-          <a:prstGeom prst="rect">
-            <a:avLst/>
-          </a:prstGeom>
-        </p:spPr>
-      </p:pic>
       <p:sp>
         <p:nvSpPr>
           <p:cNvPr id="8" name="Slide Number Placeholder 7">
@@ -3974,7 +3960,7 @@
           <p:nvPr/>
         </p:nvPicPr>
         <p:blipFill>
-          <a:blip r:embed="rId4">
+          <a:blip r:embed="rId3">
             <a:extLst>
               <a:ext uri="{28A0092B-C50C-407E-A947-70E740481C1C}">
                 <a14:useLocalDpi xmlns:a14="http://schemas.microsoft.com/office/drawing/2010/main" val="0"/>
@@ -4004,6 +3990,42 @@
               </a14:hiddenFill>
             </a:ext>
           </a:extLst>
+        </p:spPr>
+      </p:pic>
+      <p:pic>
+        <p:nvPicPr>
+          <p:cNvPr id="7" name="Picture 6">
+            <a:extLst>
+              <a:ext uri="{FF2B5EF4-FFF2-40B4-BE49-F238E27FC236}">
+                <a16:creationId xmlns:a16="http://schemas.microsoft.com/office/drawing/2014/main" id="{8394C1F9-61B6-4F18-B6C8-2C2B9ECD2F74}"/>
+              </a:ext>
+            </a:extLst>
+          </p:cNvPr>
+          <p:cNvPicPr>
+            <a:picLocks noChangeAspect="1"/>
+          </p:cNvPicPr>
+          <p:nvPr/>
+        </p:nvPicPr>
+        <p:blipFill>
+          <a:blip r:embed="rId4">
+            <a:extLst>
+              <a:ext uri="{28A0092B-C50C-407E-A947-70E740481C1C}">
+                <a14:useLocalDpi xmlns:a14="http://schemas.microsoft.com/office/drawing/2010/main" val="0"/>
+              </a:ext>
+            </a:extLst>
+          </a:blip>
+          <a:stretch>
+            <a:fillRect/>
+          </a:stretch>
+        </p:blipFill>
+        <p:spPr>
+          <a:xfrm>
+            <a:off x="10695431" y="38748"/>
+            <a:ext cx="1496569" cy="861714"/>
+          </a:xfrm>
+          <a:prstGeom prst="rect">
+            <a:avLst/>
+          </a:prstGeom>
         </p:spPr>
       </p:pic>
     </p:spTree>
@@ -5474,7 +5496,7 @@
           <a:graphicData uri="http://schemas.openxmlformats.org/presentationml/2006/ole">
             <mc:AlternateContent xmlns:mc="http://schemas.openxmlformats.org/markup-compatibility/2006">
               <mc:Choice xmlns:v="urn:schemas-microsoft-com:vml" Requires="v">
-                <p:oleObj spid="_x0000_s6155" name="Equation" r:id="rId3" imgW="1219200" imgH="419100" progId="Equation.DSMT4">
+                <p:oleObj spid="_x0000_s6158" name="Equation" r:id="rId3" imgW="1219200" imgH="419100" progId="Equation.DSMT4">
                   <p:embed/>
                 </p:oleObj>
               </mc:Choice>
@@ -16728,7 +16750,7 @@
           <a:graphicData uri="http://schemas.openxmlformats.org/presentationml/2006/ole">
             <mc:AlternateContent xmlns:mc="http://schemas.openxmlformats.org/markup-compatibility/2006">
               <mc:Choice xmlns:v="urn:schemas-microsoft-com:vml" Requires="v">
-                <p:oleObj spid="_x0000_s2125" name="Equation" r:id="rId3" imgW="1396394" imgH="203112" progId="Equation.DSMT4">
+                <p:oleObj spid="_x0000_s2128" name="Equation" r:id="rId3" imgW="1396394" imgH="203112" progId="Equation.DSMT4">
                   <p:embed/>
                 </p:oleObj>
               </mc:Choice>
@@ -17092,7 +17114,7 @@
           <a:graphicData uri="http://schemas.openxmlformats.org/presentationml/2006/ole">
             <mc:AlternateContent xmlns:mc="http://schemas.openxmlformats.org/markup-compatibility/2006">
               <mc:Choice xmlns:v="urn:schemas-microsoft-com:vml" Requires="v">
-                <p:oleObj spid="_x0000_s3147" name="Equation" r:id="rId3" imgW="1790700" imgH="228600" progId="Equation.DSMT4">
+                <p:oleObj spid="_x0000_s3150" name="Equation" r:id="rId3" imgW="1790700" imgH="228600" progId="Equation.DSMT4">
                   <p:embed/>
                 </p:oleObj>
               </mc:Choice>

</xml_diff>